<commit_message>
add new power point
</commit_message>
<xml_diff>
--- a/document/police FI.pptx
+++ b/document/police FI.pptx
@@ -116,7 +116,7 @@
   </p:defaultTextStyle>
   <p:extLst>
     <p:ext uri="{EFAFB233-063F-42B5-8137-9DF3F51BA10A}">
-      <p15:sldGuideLst xmlns:p15="http://schemas.microsoft.com/office/powerpoint/2012/main">
+      <p15:sldGuideLst xmlns:p15="http://schemas.microsoft.com/office/powerpoint/2012/main" xmlns="">
         <p15:guide id="1" orient="horz" pos="2160">
           <p15:clr>
             <a:srgbClr val="A4A3A4"/>
@@ -314,7 +314,7 @@
           <a:p>
             <a:fld id="{126A24E0-257D-4944-862E-673B8AA467B8}" type="datetimeFigureOut">
               <a:rPr lang="en-US" smtClean="0"/>
-              <a:t>7/19/2016</a:t>
+              <a:t>7/19/16</a:t>
             </a:fld>
             <a:endParaRPr lang="en-US"/>
           </a:p>
@@ -484,7 +484,7 @@
           <a:p>
             <a:fld id="{126A24E0-257D-4944-862E-673B8AA467B8}" type="datetimeFigureOut">
               <a:rPr lang="en-US" smtClean="0"/>
-              <a:t>7/19/2016</a:t>
+              <a:t>7/19/16</a:t>
             </a:fld>
             <a:endParaRPr lang="en-US"/>
           </a:p>
@@ -664,7 +664,7 @@
           <a:p>
             <a:fld id="{126A24E0-257D-4944-862E-673B8AA467B8}" type="datetimeFigureOut">
               <a:rPr lang="en-US" smtClean="0"/>
-              <a:t>7/19/2016</a:t>
+              <a:t>7/19/16</a:t>
             </a:fld>
             <a:endParaRPr lang="en-US"/>
           </a:p>
@@ -834,7 +834,7 @@
           <a:p>
             <a:fld id="{126A24E0-257D-4944-862E-673B8AA467B8}" type="datetimeFigureOut">
               <a:rPr lang="en-US" smtClean="0"/>
-              <a:t>7/19/2016</a:t>
+              <a:t>7/19/16</a:t>
             </a:fld>
             <a:endParaRPr lang="en-US"/>
           </a:p>
@@ -1080,7 +1080,7 @@
           <a:p>
             <a:fld id="{126A24E0-257D-4944-862E-673B8AA467B8}" type="datetimeFigureOut">
               <a:rPr lang="en-US" smtClean="0"/>
-              <a:t>7/19/2016</a:t>
+              <a:t>7/19/16</a:t>
             </a:fld>
             <a:endParaRPr lang="en-US"/>
           </a:p>
@@ -1368,7 +1368,7 @@
           <a:p>
             <a:fld id="{126A24E0-257D-4944-862E-673B8AA467B8}" type="datetimeFigureOut">
               <a:rPr lang="en-US" smtClean="0"/>
-              <a:t>7/19/2016</a:t>
+              <a:t>7/19/16</a:t>
             </a:fld>
             <a:endParaRPr lang="en-US"/>
           </a:p>
@@ -1790,7 +1790,7 @@
           <a:p>
             <a:fld id="{126A24E0-257D-4944-862E-673B8AA467B8}" type="datetimeFigureOut">
               <a:rPr lang="en-US" smtClean="0"/>
-              <a:t>7/19/2016</a:t>
+              <a:t>7/19/16</a:t>
             </a:fld>
             <a:endParaRPr lang="en-US"/>
           </a:p>
@@ -1908,7 +1908,7 @@
           <a:p>
             <a:fld id="{126A24E0-257D-4944-862E-673B8AA467B8}" type="datetimeFigureOut">
               <a:rPr lang="en-US" smtClean="0"/>
-              <a:t>7/19/2016</a:t>
+              <a:t>7/19/16</a:t>
             </a:fld>
             <a:endParaRPr lang="en-US"/>
           </a:p>
@@ -2003,7 +2003,7 @@
           <a:p>
             <a:fld id="{126A24E0-257D-4944-862E-673B8AA467B8}" type="datetimeFigureOut">
               <a:rPr lang="en-US" smtClean="0"/>
-              <a:t>7/19/2016</a:t>
+              <a:t>7/19/16</a:t>
             </a:fld>
             <a:endParaRPr lang="en-US"/>
           </a:p>
@@ -2280,7 +2280,7 @@
           <a:p>
             <a:fld id="{126A24E0-257D-4944-862E-673B8AA467B8}" type="datetimeFigureOut">
               <a:rPr lang="en-US" smtClean="0"/>
-              <a:t>7/19/2016</a:t>
+              <a:t>7/19/16</a:t>
             </a:fld>
             <a:endParaRPr lang="en-US"/>
           </a:p>
@@ -2533,7 +2533,7 @@
           <a:p>
             <a:fld id="{126A24E0-257D-4944-862E-673B8AA467B8}" type="datetimeFigureOut">
               <a:rPr lang="en-US" smtClean="0"/>
-              <a:t>7/19/2016</a:t>
+              <a:t>7/19/16</a:t>
             </a:fld>
             <a:endParaRPr lang="en-US"/>
           </a:p>
@@ -2749,7 +2749,7 @@
           <a:p>
             <a:fld id="{126A24E0-257D-4944-862E-673B8AA467B8}" type="datetimeFigureOut">
               <a:rPr lang="en-US" smtClean="0"/>
-              <a:t>7/19/2016</a:t>
+              <a:t>7/19/16</a:t>
             </a:fld>
             <a:endParaRPr lang="en-US"/>
           </a:p>
@@ -3280,7 +3280,7 @@
   <p:timing>
     <p:tnLst>
       <p:par>
-        <p:cTn id="1" dur="indefinite" restart="never" nodeType="tmRoot"/>
+        <p:cTn xmlns:p14="http://schemas.microsoft.com/office/powerpoint/2010/main" id="1" dur="indefinite" restart="never" nodeType="tmRoot"/>
       </p:par>
     </p:tnLst>
   </p:timing>
@@ -3421,7 +3421,7 @@
   <p:timing>
     <p:tnLst>
       <p:par>
-        <p:cTn id="1" dur="indefinite" restart="never" nodeType="tmRoot"/>
+        <p:cTn xmlns:p14="http://schemas.microsoft.com/office/powerpoint/2010/main" id="1" dur="indefinite" restart="never" nodeType="tmRoot"/>
       </p:par>
     </p:tnLst>
   </p:timing>
@@ -3510,6 +3510,342 @@
           </a:p>
         </p:txBody>
       </p:sp>
+      <p:pic>
+        <p:nvPicPr>
+          <p:cNvPr id="4" name="Picture 3"/>
+          <p:cNvPicPr>
+            <a:picLocks noChangeAspect="1"/>
+          </p:cNvPicPr>
+          <p:nvPr/>
+        </p:nvPicPr>
+        <p:blipFill>
+          <a:blip r:embed="rId2"/>
+          <a:stretch>
+            <a:fillRect/>
+          </a:stretch>
+        </p:blipFill>
+        <p:spPr>
+          <a:xfrm>
+            <a:off x="7524328" y="4149080"/>
+            <a:ext cx="1152128" cy="1152128"/>
+          </a:xfrm>
+          <a:prstGeom prst="rect">
+            <a:avLst/>
+          </a:prstGeom>
+        </p:spPr>
+      </p:pic>
+      <p:pic>
+        <p:nvPicPr>
+          <p:cNvPr id="5" name="Picture 4"/>
+          <p:cNvPicPr>
+            <a:picLocks noChangeAspect="1"/>
+          </p:cNvPicPr>
+          <p:nvPr/>
+        </p:nvPicPr>
+        <p:blipFill>
+          <a:blip r:embed="rId3"/>
+          <a:stretch>
+            <a:fillRect/>
+          </a:stretch>
+        </p:blipFill>
+        <p:spPr>
+          <a:xfrm>
+            <a:off x="1403648" y="1124744"/>
+            <a:ext cx="1296482" cy="1227336"/>
+          </a:xfrm>
+          <a:prstGeom prst="rect">
+            <a:avLst/>
+          </a:prstGeom>
+        </p:spPr>
+      </p:pic>
+      <p:sp>
+        <p:nvSpPr>
+          <p:cNvPr id="6" name="Down Arrow 5"/>
+          <p:cNvSpPr/>
+          <p:nvPr/>
+        </p:nvSpPr>
+        <p:spPr>
+          <a:xfrm rot="19170429">
+            <a:off x="2947224" y="2176201"/>
+            <a:ext cx="412548" cy="1357826"/>
+          </a:xfrm>
+          <a:prstGeom prst="downArrow">
+            <a:avLst/>
+          </a:prstGeom>
+        </p:spPr>
+        <p:style>
+          <a:lnRef idx="2">
+            <a:schemeClr val="accent1">
+              <a:shade val="50000"/>
+            </a:schemeClr>
+          </a:lnRef>
+          <a:fillRef idx="1">
+            <a:schemeClr val="accent1"/>
+          </a:fillRef>
+          <a:effectRef idx="0">
+            <a:schemeClr val="accent1"/>
+          </a:effectRef>
+          <a:fontRef idx="minor">
+            <a:schemeClr val="lt1"/>
+          </a:fontRef>
+        </p:style>
+        <p:txBody>
+          <a:bodyPr rtlCol="0" anchor="ctr"/>
+          <a:lstStyle/>
+          <a:p>
+            <a:pPr algn="ctr"/>
+            <a:endParaRPr lang="en-US"/>
+          </a:p>
+        </p:txBody>
+      </p:sp>
+      <p:sp>
+        <p:nvSpPr>
+          <p:cNvPr id="7" name="TextBox 6"/>
+          <p:cNvSpPr txBox="1"/>
+          <p:nvPr/>
+        </p:nvSpPr>
+        <p:spPr>
+          <a:xfrm>
+            <a:off x="2771800" y="1268760"/>
+            <a:ext cx="1318436" cy="369332"/>
+          </a:xfrm>
+          <a:prstGeom prst="rect">
+            <a:avLst/>
+          </a:prstGeom>
+          <a:noFill/>
+        </p:spPr>
+        <p:txBody>
+          <a:bodyPr wrap="square" rtlCol="0">
+            <a:spAutoFit/>
+          </a:bodyPr>
+          <a:lstStyle/>
+          <a:p>
+            <a:r>
+              <a:rPr lang="en-US" dirty="0"/>
+              <a:t>I</a:t>
+            </a:r>
+            <a:r>
+              <a:rPr lang="en-US" dirty="0" smtClean="0"/>
+              <a:t>nterface</a:t>
+            </a:r>
+            <a:endParaRPr lang="en-US" dirty="0"/>
+          </a:p>
+        </p:txBody>
+      </p:sp>
+      <p:sp>
+        <p:nvSpPr>
+          <p:cNvPr id="8" name="TextBox 7"/>
+          <p:cNvSpPr txBox="1"/>
+          <p:nvPr/>
+        </p:nvSpPr>
+        <p:spPr>
+          <a:xfrm>
+            <a:off x="7524328" y="3717032"/>
+            <a:ext cx="1318436" cy="369332"/>
+          </a:xfrm>
+          <a:prstGeom prst="rect">
+            <a:avLst/>
+          </a:prstGeom>
+          <a:noFill/>
+        </p:spPr>
+        <p:txBody>
+          <a:bodyPr wrap="square" rtlCol="0">
+            <a:spAutoFit/>
+          </a:bodyPr>
+          <a:lstStyle/>
+          <a:p>
+            <a:r>
+              <a:rPr lang="en-US" dirty="0" smtClean="0"/>
+              <a:t>Database</a:t>
+            </a:r>
+            <a:endParaRPr lang="en-US" dirty="0"/>
+          </a:p>
+        </p:txBody>
+      </p:sp>
+      <p:pic>
+        <p:nvPicPr>
+          <p:cNvPr id="9" name="Picture 8"/>
+          <p:cNvPicPr>
+            <a:picLocks noChangeAspect="1"/>
+          </p:cNvPicPr>
+          <p:nvPr/>
+        </p:nvPicPr>
+        <p:blipFill>
+          <a:blip r:embed="rId4"/>
+          <a:stretch>
+            <a:fillRect/>
+          </a:stretch>
+        </p:blipFill>
+        <p:spPr>
+          <a:xfrm>
+            <a:off x="3707904" y="2636912"/>
+            <a:ext cx="2553072" cy="2553072"/>
+          </a:xfrm>
+          <a:prstGeom prst="rect">
+            <a:avLst/>
+          </a:prstGeom>
+        </p:spPr>
+      </p:pic>
+      <p:sp>
+        <p:nvSpPr>
+          <p:cNvPr id="10" name="Down Arrow 9"/>
+          <p:cNvSpPr/>
+          <p:nvPr/>
+        </p:nvSpPr>
+        <p:spPr>
+          <a:xfrm rot="16200000">
+            <a:off x="6696232" y="4185088"/>
+            <a:ext cx="412548" cy="1060612"/>
+          </a:xfrm>
+          <a:prstGeom prst="downArrow">
+            <a:avLst/>
+          </a:prstGeom>
+        </p:spPr>
+        <p:style>
+          <a:lnRef idx="2">
+            <a:schemeClr val="accent1">
+              <a:shade val="50000"/>
+            </a:schemeClr>
+          </a:lnRef>
+          <a:fillRef idx="1">
+            <a:schemeClr val="accent1"/>
+          </a:fillRef>
+          <a:effectRef idx="0">
+            <a:schemeClr val="accent1"/>
+          </a:effectRef>
+          <a:fontRef idx="minor">
+            <a:schemeClr val="lt1"/>
+          </a:fontRef>
+        </p:style>
+        <p:txBody>
+          <a:bodyPr rtlCol="0" anchor="ctr"/>
+          <a:lstStyle/>
+          <a:p>
+            <a:pPr algn="ctr"/>
+            <a:endParaRPr lang="en-US"/>
+          </a:p>
+        </p:txBody>
+      </p:sp>
+      <p:sp>
+        <p:nvSpPr>
+          <p:cNvPr id="11" name="TextBox 10"/>
+          <p:cNvSpPr txBox="1"/>
+          <p:nvPr/>
+        </p:nvSpPr>
+        <p:spPr>
+          <a:xfrm>
+            <a:off x="3779912" y="5229200"/>
+            <a:ext cx="1318436" cy="369332"/>
+          </a:xfrm>
+          <a:prstGeom prst="rect">
+            <a:avLst/>
+          </a:prstGeom>
+          <a:noFill/>
+        </p:spPr>
+        <p:txBody>
+          <a:bodyPr wrap="square" rtlCol="0">
+            <a:spAutoFit/>
+          </a:bodyPr>
+          <a:lstStyle/>
+          <a:p>
+            <a:r>
+              <a:rPr lang="en-US" dirty="0" smtClean="0"/>
+              <a:t>API</a:t>
+            </a:r>
+            <a:endParaRPr lang="en-US" dirty="0"/>
+          </a:p>
+        </p:txBody>
+      </p:sp>
+      <p:sp>
+        <p:nvSpPr>
+          <p:cNvPr id="12" name="TextBox 11"/>
+          <p:cNvSpPr txBox="1"/>
+          <p:nvPr/>
+        </p:nvSpPr>
+        <p:spPr>
+          <a:xfrm>
+            <a:off x="1403648" y="6093296"/>
+            <a:ext cx="1318436" cy="369332"/>
+          </a:xfrm>
+          <a:prstGeom prst="rect">
+            <a:avLst/>
+          </a:prstGeom>
+          <a:noFill/>
+        </p:spPr>
+        <p:txBody>
+          <a:bodyPr wrap="square" rtlCol="0">
+            <a:spAutoFit/>
+          </a:bodyPr>
+          <a:lstStyle/>
+          <a:p>
+            <a:r>
+              <a:rPr lang="en-US" dirty="0" err="1" smtClean="0"/>
+              <a:t>Stanslaus</a:t>
+            </a:r>
+            <a:endParaRPr lang="en-US" dirty="0"/>
+          </a:p>
+        </p:txBody>
+      </p:sp>
+      <p:sp>
+        <p:nvSpPr>
+          <p:cNvPr id="13" name="TextBox 12"/>
+          <p:cNvSpPr txBox="1"/>
+          <p:nvPr/>
+        </p:nvSpPr>
+        <p:spPr>
+          <a:xfrm>
+            <a:off x="4572000" y="6093296"/>
+            <a:ext cx="1318436" cy="369332"/>
+          </a:xfrm>
+          <a:prstGeom prst="rect">
+            <a:avLst/>
+          </a:prstGeom>
+          <a:noFill/>
+        </p:spPr>
+        <p:txBody>
+          <a:bodyPr wrap="square" rtlCol="0">
+            <a:spAutoFit/>
+          </a:bodyPr>
+          <a:lstStyle/>
+          <a:p>
+            <a:r>
+              <a:rPr lang="en-US" dirty="0" err="1" smtClean="0"/>
+              <a:t>Thuo</a:t>
+            </a:r>
+            <a:endParaRPr lang="en-US" dirty="0"/>
+          </a:p>
+        </p:txBody>
+      </p:sp>
+      <p:sp>
+        <p:nvSpPr>
+          <p:cNvPr id="14" name="TextBox 13"/>
+          <p:cNvSpPr txBox="1"/>
+          <p:nvPr/>
+        </p:nvSpPr>
+        <p:spPr>
+          <a:xfrm>
+            <a:off x="7452320" y="6093296"/>
+            <a:ext cx="1318436" cy="369332"/>
+          </a:xfrm>
+          <a:prstGeom prst="rect">
+            <a:avLst/>
+          </a:prstGeom>
+          <a:noFill/>
+        </p:spPr>
+        <p:txBody>
+          <a:bodyPr wrap="square" rtlCol="0">
+            <a:spAutoFit/>
+          </a:bodyPr>
+          <a:lstStyle/>
+          <a:p>
+            <a:r>
+              <a:rPr lang="en-US" dirty="0" smtClean="0"/>
+              <a:t>Ernest</a:t>
+            </a:r>
+            <a:endParaRPr lang="en-US" dirty="0"/>
+          </a:p>
+        </p:txBody>
+      </p:sp>
     </p:spTree>
     <p:extLst>
       <p:ext uri="{BB962C8B-B14F-4D97-AF65-F5344CB8AC3E}">
@@ -3523,7 +3859,7 @@
   <p:timing>
     <p:tnLst>
       <p:par>
-        <p:cTn id="1" dur="indefinite" restart="never" nodeType="tmRoot"/>
+        <p:cTn xmlns:p14="http://schemas.microsoft.com/office/powerpoint/2010/main" id="1" dur="indefinite" restart="never" nodeType="tmRoot"/>
       </p:par>
     </p:tnLst>
   </p:timing>
@@ -3708,7 +4044,7 @@
   <p:timing>
     <p:tnLst>
       <p:par>
-        <p:cTn id="1" dur="indefinite" restart="never" nodeType="tmRoot"/>
+        <p:cTn xmlns:p14="http://schemas.microsoft.com/office/powerpoint/2010/main" id="1" dur="indefinite" restart="never" nodeType="tmRoot"/>
       </p:par>
     </p:tnLst>
   </p:timing>
@@ -3815,7 +4151,7 @@
   <p:timing>
     <p:tnLst>
       <p:par>
-        <p:cTn id="1" dur="indefinite" restart="never" nodeType="tmRoot"/>
+        <p:cTn xmlns:p14="http://schemas.microsoft.com/office/powerpoint/2010/main" id="1" dur="indefinite" restart="never" nodeType="tmRoot"/>
       </p:par>
     </p:tnLst>
   </p:timing>
@@ -3916,7 +4252,7 @@
   <p:timing>
     <p:tnLst>
       <p:par>
-        <p:cTn id="1" dur="indefinite" restart="never" nodeType="tmRoot"/>
+        <p:cTn xmlns:p14="http://schemas.microsoft.com/office/powerpoint/2010/main" id="1" dur="indefinite" restart="never" nodeType="tmRoot"/>
       </p:par>
     </p:tnLst>
   </p:timing>
@@ -4468,7 +4804,7 @@
   <p:timing>
     <p:tnLst>
       <p:par>
-        <p:cTn id="1" dur="indefinite" restart="never" nodeType="tmRoot"/>
+        <p:cTn xmlns:p14="http://schemas.microsoft.com/office/powerpoint/2010/main" id="1" dur="indefinite" restart="never" nodeType="tmRoot"/>
       </p:par>
     </p:tnLst>
   </p:timing>
@@ -4626,7 +4962,7 @@
   <p:timing>
     <p:tnLst>
       <p:par>
-        <p:cTn id="1" dur="indefinite" restart="never" nodeType="tmRoot"/>
+        <p:cTn xmlns:p14="http://schemas.microsoft.com/office/powerpoint/2010/main" id="1" dur="indefinite" restart="never" nodeType="tmRoot"/>
       </p:par>
     </p:tnLst>
   </p:timing>
@@ -4993,7 +5329,7 @@
   <p:timing>
     <p:tnLst>
       <p:par>
-        <p:cTn id="1" dur="indefinite" restart="never" nodeType="tmRoot"/>
+        <p:cTn xmlns:p14="http://schemas.microsoft.com/office/powerpoint/2010/main" id="1" dur="indefinite" restart="never" nodeType="tmRoot"/>
       </p:par>
     </p:tnLst>
   </p:timing>
@@ -5095,7 +5431,7 @@
   <p:timing>
     <p:tnLst>
       <p:par>
-        <p:cTn id="1" dur="indefinite" restart="never" nodeType="tmRoot"/>
+        <p:cTn xmlns:p14="http://schemas.microsoft.com/office/powerpoint/2010/main" id="1" dur="indefinite" restart="never" nodeType="tmRoot"/>
       </p:par>
     </p:tnLst>
   </p:timing>
@@ -5199,7 +5535,7 @@
   <p:timing>
     <p:tnLst>
       <p:par>
-        <p:cTn id="1" dur="indefinite" restart="never" nodeType="tmRoot"/>
+        <p:cTn xmlns:p14="http://schemas.microsoft.com/office/powerpoint/2010/main" id="1" dur="indefinite" restart="never" nodeType="tmRoot"/>
       </p:par>
     </p:tnLst>
   </p:timing>

</xml_diff>